<commit_message>
almost ready to submis
</commit_message>
<xml_diff>
--- a/figs/Fig_Results_DoubleWell.pptx
+++ b/figs/Fig_Results_DoubleWell.pptx
@@ -243,7 +243,7 @@
           <a:p>
             <a:fld id="{2DF69B4B-5AE9-AC4D-9EFA-9FD7F0F1516D}" type="datetimeFigureOut">
               <a:rPr lang="de-DE" smtClean="0"/>
-              <a:t>03.11.18</a:t>
+              <a:t>13.11.18</a:t>
             </a:fld>
             <a:endParaRPr lang="de-DE"/>
           </a:p>
@@ -413,7 +413,7 @@
           <a:p>
             <a:fld id="{2DF69B4B-5AE9-AC4D-9EFA-9FD7F0F1516D}" type="datetimeFigureOut">
               <a:rPr lang="de-DE" smtClean="0"/>
-              <a:t>03.11.18</a:t>
+              <a:t>13.11.18</a:t>
             </a:fld>
             <a:endParaRPr lang="de-DE"/>
           </a:p>
@@ -593,7 +593,7 @@
           <a:p>
             <a:fld id="{2DF69B4B-5AE9-AC4D-9EFA-9FD7F0F1516D}" type="datetimeFigureOut">
               <a:rPr lang="de-DE" smtClean="0"/>
-              <a:t>03.11.18</a:t>
+              <a:t>13.11.18</a:t>
             </a:fld>
             <a:endParaRPr lang="de-DE"/>
           </a:p>
@@ -763,7 +763,7 @@
           <a:p>
             <a:fld id="{2DF69B4B-5AE9-AC4D-9EFA-9FD7F0F1516D}" type="datetimeFigureOut">
               <a:rPr lang="de-DE" smtClean="0"/>
-              <a:t>03.11.18</a:t>
+              <a:t>13.11.18</a:t>
             </a:fld>
             <a:endParaRPr lang="de-DE"/>
           </a:p>
@@ -1007,7 +1007,7 @@
           <a:p>
             <a:fld id="{2DF69B4B-5AE9-AC4D-9EFA-9FD7F0F1516D}" type="datetimeFigureOut">
               <a:rPr lang="de-DE" smtClean="0"/>
-              <a:t>03.11.18</a:t>
+              <a:t>13.11.18</a:t>
             </a:fld>
             <a:endParaRPr lang="de-DE"/>
           </a:p>
@@ -1239,7 +1239,7 @@
           <a:p>
             <a:fld id="{2DF69B4B-5AE9-AC4D-9EFA-9FD7F0F1516D}" type="datetimeFigureOut">
               <a:rPr lang="de-DE" smtClean="0"/>
-              <a:t>03.11.18</a:t>
+              <a:t>13.11.18</a:t>
             </a:fld>
             <a:endParaRPr lang="de-DE"/>
           </a:p>
@@ -1606,7 +1606,7 @@
           <a:p>
             <a:fld id="{2DF69B4B-5AE9-AC4D-9EFA-9FD7F0F1516D}" type="datetimeFigureOut">
               <a:rPr lang="de-DE" smtClean="0"/>
-              <a:t>03.11.18</a:t>
+              <a:t>13.11.18</a:t>
             </a:fld>
             <a:endParaRPr lang="de-DE"/>
           </a:p>
@@ -1724,7 +1724,7 @@
           <a:p>
             <a:fld id="{2DF69B4B-5AE9-AC4D-9EFA-9FD7F0F1516D}" type="datetimeFigureOut">
               <a:rPr lang="de-DE" smtClean="0"/>
-              <a:t>03.11.18</a:t>
+              <a:t>13.11.18</a:t>
             </a:fld>
             <a:endParaRPr lang="de-DE"/>
           </a:p>
@@ -1819,7 +1819,7 @@
           <a:p>
             <a:fld id="{2DF69B4B-5AE9-AC4D-9EFA-9FD7F0F1516D}" type="datetimeFigureOut">
               <a:rPr lang="de-DE" smtClean="0"/>
-              <a:t>03.11.18</a:t>
+              <a:t>13.11.18</a:t>
             </a:fld>
             <a:endParaRPr lang="de-DE"/>
           </a:p>
@@ -2096,7 +2096,7 @@
           <a:p>
             <a:fld id="{2DF69B4B-5AE9-AC4D-9EFA-9FD7F0F1516D}" type="datetimeFigureOut">
               <a:rPr lang="de-DE" smtClean="0"/>
-              <a:t>03.11.18</a:t>
+              <a:t>13.11.18</a:t>
             </a:fld>
             <a:endParaRPr lang="de-DE"/>
           </a:p>
@@ -2353,7 +2353,7 @@
           <a:p>
             <a:fld id="{2DF69B4B-5AE9-AC4D-9EFA-9FD7F0F1516D}" type="datetimeFigureOut">
               <a:rPr lang="de-DE" smtClean="0"/>
-              <a:t>03.11.18</a:t>
+              <a:t>13.11.18</a:t>
             </a:fld>
             <a:endParaRPr lang="de-DE"/>
           </a:p>
@@ -2566,7 +2566,7 @@
           <a:p>
             <a:fld id="{2DF69B4B-5AE9-AC4D-9EFA-9FD7F0F1516D}" type="datetimeFigureOut">
               <a:rPr lang="de-DE" smtClean="0"/>
-              <a:t>03.11.18</a:t>
+              <a:t>13.11.18</a:t>
             </a:fld>
             <a:endParaRPr lang="de-DE"/>
           </a:p>
@@ -2973,10 +2973,10 @@
       </p:grpSpPr>
       <p:pic>
         <p:nvPicPr>
-          <p:cNvPr id="92" name="Picture 91">
+          <p:cNvPr id="39" name="Picture 38">
             <a:extLst>
               <a:ext uri="{FF2B5EF4-FFF2-40B4-BE49-F238E27FC236}">
-                <a16:creationId xmlns:a16="http://schemas.microsoft.com/office/drawing/2014/main" id="{04D51562-0708-B145-80DB-E8E18AB95953}"/>
+                <a16:creationId xmlns:a16="http://schemas.microsoft.com/office/drawing/2014/main" id="{825D4078-31F9-1D4A-99EB-D0BDB2F8F08F}"/>
               </a:ext>
             </a:extLst>
           </p:cNvPr>
@@ -2999,8 +2999,8 @@
         </p:blipFill>
         <p:spPr>
           <a:xfrm>
-            <a:off x="3373075" y="1606449"/>
-            <a:ext cx="1871889" cy="1722636"/>
+            <a:off x="3377656" y="1606449"/>
+            <a:ext cx="1865027" cy="1716321"/>
           </a:xfrm>
           <a:prstGeom prst="rect">
             <a:avLst/>
@@ -3009,10 +3009,10 @@
       </p:pic>
       <p:pic>
         <p:nvPicPr>
-          <p:cNvPr id="93" name="Picture 92">
+          <p:cNvPr id="40" name="Picture 39">
             <a:extLst>
               <a:ext uri="{FF2B5EF4-FFF2-40B4-BE49-F238E27FC236}">
-                <a16:creationId xmlns:a16="http://schemas.microsoft.com/office/drawing/2014/main" id="{9F1ACAE6-F033-B043-AF31-3565AFF40966}"/>
+                <a16:creationId xmlns:a16="http://schemas.microsoft.com/office/drawing/2014/main" id="{94716245-30F3-524B-8922-01F9C4D63C19}"/>
               </a:ext>
             </a:extLst>
           </p:cNvPr>
@@ -3035,8 +3035,80 @@
         </p:blipFill>
         <p:spPr>
           <a:xfrm>
-            <a:off x="3371165" y="3586888"/>
-            <a:ext cx="1871889" cy="1722636"/>
+            <a:off x="3377656" y="3601592"/>
+            <a:ext cx="1865027" cy="1716321"/>
+          </a:xfrm>
+          <a:prstGeom prst="rect">
+            <a:avLst/>
+          </a:prstGeom>
+        </p:spPr>
+      </p:pic>
+      <p:pic>
+        <p:nvPicPr>
+          <p:cNvPr id="33" name="Picture 32">
+            <a:extLst>
+              <a:ext uri="{FF2B5EF4-FFF2-40B4-BE49-F238E27FC236}">
+                <a16:creationId xmlns:a16="http://schemas.microsoft.com/office/drawing/2014/main" id="{9BD787C7-0360-1C40-A4E6-65E58C08F2C7}"/>
+              </a:ext>
+            </a:extLst>
+          </p:cNvPr>
+          <p:cNvPicPr>
+            <a:picLocks noChangeAspect="1"/>
+          </p:cNvPicPr>
+          <p:nvPr/>
+        </p:nvPicPr>
+        <p:blipFill>
+          <a:blip r:embed="rId4">
+            <a:extLst>
+              <a:ext uri="{28A0092B-C50C-407E-A947-70E740481C1C}">
+                <a14:useLocalDpi xmlns:a14="http://schemas.microsoft.com/office/drawing/2010/main" val="0"/>
+              </a:ext>
+            </a:extLst>
+          </a:blip>
+          <a:stretch>
+            <a:fillRect/>
+          </a:stretch>
+        </p:blipFill>
+        <p:spPr>
+          <a:xfrm>
+            <a:off x="1565237" y="3592112"/>
+            <a:ext cx="1805928" cy="1725801"/>
+          </a:xfrm>
+          <a:prstGeom prst="rect">
+            <a:avLst/>
+          </a:prstGeom>
+        </p:spPr>
+      </p:pic>
+      <p:pic>
+        <p:nvPicPr>
+          <p:cNvPr id="34" name="Picture 33">
+            <a:extLst>
+              <a:ext uri="{FF2B5EF4-FFF2-40B4-BE49-F238E27FC236}">
+                <a16:creationId xmlns:a16="http://schemas.microsoft.com/office/drawing/2014/main" id="{5CA77BE0-DBCC-1344-8003-2013F44AA387}"/>
+              </a:ext>
+            </a:extLst>
+          </p:cNvPr>
+          <p:cNvPicPr>
+            <a:picLocks noChangeAspect="1"/>
+          </p:cNvPicPr>
+          <p:nvPr/>
+        </p:nvPicPr>
+        <p:blipFill>
+          <a:blip r:embed="rId5">
+            <a:extLst>
+              <a:ext uri="{28A0092B-C50C-407E-A947-70E740481C1C}">
+                <a14:useLocalDpi xmlns:a14="http://schemas.microsoft.com/office/drawing/2010/main" val="0"/>
+              </a:ext>
+            </a:extLst>
+          </a:blip>
+          <a:stretch>
+            <a:fillRect/>
+          </a:stretch>
+        </p:blipFill>
+        <p:spPr>
+          <a:xfrm>
+            <a:off x="-41247" y="3596645"/>
+            <a:ext cx="1805928" cy="1725801"/>
           </a:xfrm>
           <a:prstGeom prst="rect">
             <a:avLst/>
@@ -3058,7 +3130,7 @@
           <p:nvPr/>
         </p:nvPicPr>
         <p:blipFill>
-          <a:blip r:embed="rId4">
+          <a:blip r:embed="rId6">
             <a:clrChange>
               <a:clrFrom>
                 <a:srgbClr val="000000">
@@ -3085,78 +3157,6 @@
           <a:xfrm>
             <a:off x="1462" y="0"/>
             <a:ext cx="2034613" cy="1609298"/>
-          </a:xfrm>
-          <a:prstGeom prst="rect">
-            <a:avLst/>
-          </a:prstGeom>
-        </p:spPr>
-      </p:pic>
-      <p:pic>
-        <p:nvPicPr>
-          <p:cNvPr id="22" name="Picture 21">
-            <a:extLst>
-              <a:ext uri="{FF2B5EF4-FFF2-40B4-BE49-F238E27FC236}">
-                <a16:creationId xmlns:a16="http://schemas.microsoft.com/office/drawing/2014/main" id="{53476387-0D46-394B-9AF3-AA73F7506770}"/>
-              </a:ext>
-            </a:extLst>
-          </p:cNvPr>
-          <p:cNvPicPr>
-            <a:picLocks noChangeAspect="1"/>
-          </p:cNvPicPr>
-          <p:nvPr/>
-        </p:nvPicPr>
-        <p:blipFill>
-          <a:blip r:embed="rId5">
-            <a:extLst>
-              <a:ext uri="{28A0092B-C50C-407E-A947-70E740481C1C}">
-                <a14:useLocalDpi xmlns:a14="http://schemas.microsoft.com/office/drawing/2010/main" val="0"/>
-              </a:ext>
-            </a:extLst>
-          </a:blip>
-          <a:stretch>
-            <a:fillRect/>
-          </a:stretch>
-        </p:blipFill>
-        <p:spPr>
-          <a:xfrm>
-            <a:off x="1563722" y="3560857"/>
-            <a:ext cx="1839685" cy="1758061"/>
-          </a:xfrm>
-          <a:prstGeom prst="rect">
-            <a:avLst/>
-          </a:prstGeom>
-        </p:spPr>
-      </p:pic>
-      <p:pic>
-        <p:nvPicPr>
-          <p:cNvPr id="24" name="Picture 23">
-            <a:extLst>
-              <a:ext uri="{FF2B5EF4-FFF2-40B4-BE49-F238E27FC236}">
-                <a16:creationId xmlns:a16="http://schemas.microsoft.com/office/drawing/2014/main" id="{4F1D5AA1-A30D-FD40-853D-5C54258C8077}"/>
-              </a:ext>
-            </a:extLst>
-          </p:cNvPr>
-          <p:cNvPicPr>
-            <a:picLocks noChangeAspect="1"/>
-          </p:cNvPicPr>
-          <p:nvPr/>
-        </p:nvPicPr>
-        <p:blipFill>
-          <a:blip r:embed="rId6">
-            <a:extLst>
-              <a:ext uri="{28A0092B-C50C-407E-A947-70E740481C1C}">
-                <a14:useLocalDpi xmlns:a14="http://schemas.microsoft.com/office/drawing/2010/main" val="0"/>
-              </a:ext>
-            </a:extLst>
-          </a:blip>
-          <a:stretch>
-            <a:fillRect/>
-          </a:stretch>
-        </p:blipFill>
-        <p:spPr>
-          <a:xfrm>
-            <a:off x="-32267" y="3555155"/>
-            <a:ext cx="1839685" cy="1758061"/>
           </a:xfrm>
           <a:prstGeom prst="rect">
             <a:avLst/>
@@ -3453,7 +3453,7 @@
             </a:r>
             <a:r>
               <a:rPr lang="de-DE" sz="1600" baseline="-25000" dirty="0" err="1"/>
-              <a:t>xz</a:t>
+              <a:t>zx</a:t>
             </a:r>
             <a:endParaRPr lang="de-DE" sz="1600" baseline="-25000" dirty="0"/>
           </a:p>
@@ -3493,7 +3493,7 @@
             </a:r>
             <a:r>
               <a:rPr lang="de-DE" sz="1600" baseline="-25000" dirty="0" err="1"/>
-              <a:t>zx</a:t>
+              <a:t>xz</a:t>
             </a:r>
             <a:endParaRPr lang="de-DE" sz="1600" baseline="-25000" dirty="0"/>
           </a:p>

</xml_diff>